<commit_message>
modifications on code and pptx
</commit_message>
<xml_diff>
--- a/Churn Prediction in Telecom.pptx
+++ b/Churn Prediction in Telecom.pptx
@@ -5893,15 +5893,7 @@
             </a:pPr>
             <a:r>
               <a:rPr lang="en-US" dirty="0"/>
-              <a:t>Acquiring new customers is </a:t>
-            </a:r>
-            <a:r>
-              <a:rPr lang="en-US" b="1" dirty="0"/>
-              <a:t>5x more expensive</a:t>
-            </a:r>
-            <a:r>
-              <a:rPr lang="en-US" dirty="0"/>
-              <a:t> than retaining existing ones.</a:t>
+              <a:t>Acquiring new customers is 5x more expensive than retaining existing ones.</a:t>
             </a:r>
           </a:p>
           <a:p>
@@ -5911,15 +5903,7 @@
             </a:pPr>
             <a:r>
               <a:rPr lang="en-US" dirty="0"/>
-              <a:t>Early detection of churn risk helps </a:t>
-            </a:r>
-            <a:r>
-              <a:rPr lang="en-US" b="1" dirty="0"/>
-              <a:t>increase customer loyalty and revenue</a:t>
-            </a:r>
-            <a:r>
-              <a:rPr lang="en-US" dirty="0"/>
-              <a:t>.</a:t>
+              <a:t>Early detection of churn risk helps increase customer loyalty and revenue.</a:t>
             </a:r>
           </a:p>
           <a:p>
@@ -5937,25 +5921,12 @@
             </a:r>
             <a:r>
               <a:rPr lang="en-US" dirty="0"/>
-              <a:t> goal of </a:t>
-            </a:r>
-            <a:r>
-              <a:rPr lang="en-US" b="1" dirty="0"/>
-              <a:t>enhancing customer satisfaction</a:t>
-            </a:r>
-            <a:r>
-              <a:rPr lang="en-US" dirty="0"/>
-              <a:t> and </a:t>
-            </a:r>
-            <a:r>
-              <a:rPr lang="en-US" b="1" dirty="0"/>
-              <a:t>retention</a:t>
-            </a:r>
-            <a:r>
-              <a:rPr lang="en-US" sz="2400" b="1" dirty="0"/>
+              <a:t> goal of enhancing customer satisfaction and retention</a:t>
+            </a:r>
+            <a:r>
+              <a:rPr lang="en-US" sz="2400" dirty="0"/>
               <a:t>.</a:t>
             </a:r>
-            <a:endParaRPr lang="en-US" sz="2400" dirty="0"/>
           </a:p>
           <a:p>
             <a:endParaRPr lang="en-US" sz="2800" b="1" dirty="0"/>
@@ -6139,13 +6110,8 @@
             </a:pPr>
             <a:r>
               <a:rPr lang="en-US" dirty="0"/>
-              <a:t>High churn linked to </a:t>
-            </a:r>
-            <a:r>
-              <a:rPr lang="en-US" b="1" dirty="0"/>
-              <a:t>multiple customer service calls</a:t>
-            </a:r>
-            <a:endParaRPr lang="en-US" dirty="0"/>
+              <a:t>High churn linked to multiple customer service calls</a:t>
+            </a:r>
           </a:p>
           <a:p>
             <a:pPr>
@@ -6157,15 +6123,7 @@
             </a:pPr>
             <a:r>
               <a:rPr lang="en-US" dirty="0"/>
-              <a:t>Customers without </a:t>
-            </a:r>
-            <a:r>
-              <a:rPr lang="en-US" b="1" dirty="0"/>
-              <a:t>voice mail or international plans</a:t>
-            </a:r>
-            <a:r>
-              <a:rPr lang="en-US" dirty="0"/>
-              <a:t> are more likely to churn</a:t>
+              <a:t>Customers without voice mail or international plans are more likely to churn</a:t>
             </a:r>
           </a:p>
           <a:p>
@@ -6583,7 +6541,7 @@
         <p:spPr>
           <a:xfrm>
             <a:off x="228599" y="446314"/>
-            <a:ext cx="11767457" cy="2769989"/>
+            <a:ext cx="11767457" cy="3508653"/>
           </a:xfrm>
           <a:prstGeom prst="rect">
             <a:avLst/>
@@ -6605,70 +6563,54 @@
             </a:r>
           </a:p>
           <a:p>
-            <a:pPr algn="ctr">
-              <a:buNone/>
-            </a:pPr>
-            <a:endParaRPr lang="en-US" sz="2400" b="1" dirty="0"/>
-          </a:p>
-          <a:p>
-            <a:pPr>
-              <a:buFont typeface="Arial" panose="020B0604020202020204" pitchFamily="34" charset="0"/>
-              <a:buChar char="•"/>
-            </a:pPr>
-            <a:r>
+            <a:br>
               <a:rPr lang="en-US" dirty="0"/>
-              <a:t>Customers with many customer service calls have high churn risk</a:t>
-            </a:r>
-          </a:p>
-          <a:p>
-            <a:pPr>
-              <a:buFont typeface="Arial" panose="020B0604020202020204" pitchFamily="34" charset="0"/>
-              <a:buChar char="•"/>
-            </a:pPr>
-            <a:endParaRPr lang="en-US" dirty="0"/>
-          </a:p>
-          <a:p>
-            <a:pPr>
-              <a:buFont typeface="Arial" panose="020B0604020202020204" pitchFamily="34" charset="0"/>
-              <a:buChar char="•"/>
-            </a:pPr>
+            </a:br>
             <a:r>
               <a:rPr lang="en-US" dirty="0"/>
-              <a:t>Lack of international/voice mail plans is a common trait among churners</a:t>
-            </a:r>
-          </a:p>
-          <a:p>
-            <a:pPr>
-              <a:buFont typeface="Arial" panose="020B0604020202020204" pitchFamily="34" charset="0"/>
-              <a:buChar char="•"/>
-            </a:pPr>
-            <a:endParaRPr lang="en-US" dirty="0"/>
-          </a:p>
-          <a:p>
-            <a:pPr>
-              <a:buFont typeface="Arial" panose="020B0604020202020204" pitchFamily="34" charset="0"/>
-              <a:buChar char="•"/>
-            </a:pPr>
+              <a:t>High Churn Risk Detected</a:t>
+            </a:r>
+          </a:p>
+          <a:p>
             <a:r>
               <a:rPr lang="en-US" dirty="0"/>
-              <a:t>High daytime charges correlate with churn</a:t>
-            </a:r>
-          </a:p>
-          <a:p>
-            <a:pPr>
-              <a:buFont typeface="Arial" panose="020B0604020202020204" pitchFamily="34" charset="0"/>
-              <a:buChar char="•"/>
-            </a:pPr>
-            <a:endParaRPr lang="en-US" dirty="0"/>
-          </a:p>
-          <a:p>
-            <a:pPr>
-              <a:buFont typeface="Arial" panose="020B0604020202020204" pitchFamily="34" charset="0"/>
-              <a:buChar char="•"/>
-            </a:pPr>
-            <a:r>
+              <a:t>The model shows high accuracy (AUC = 0.917) in the churn prediction.</a:t>
+            </a:r>
+          </a:p>
+          <a:p>
+            <a:br>
               <a:rPr lang="en-US" dirty="0"/>
-              <a:t>Data shows consistent patterns in how churners behave differently</a:t>
+            </a:br>
+            <a:r>
+              <a:rPr lang="en-US" dirty="0"/>
+              <a:t>This means that certain customer behaviors strongly correlate with churn, such as:</a:t>
+            </a:r>
+          </a:p>
+          <a:p>
+            <a:br>
+              <a:rPr lang="en-US" dirty="0"/>
+            </a:br>
+            <a:r>
+              <a:rPr lang="en-US" dirty="0"/>
+              <a:t>(a) High number of customer service calls.</a:t>
+            </a:r>
+          </a:p>
+          <a:p>
+            <a:br>
+              <a:rPr lang="en-US" dirty="0"/>
+            </a:br>
+            <a:r>
+              <a:rPr lang="en-US" dirty="0"/>
+              <a:t>(b) Not subscribing to voice mail or international plans.</a:t>
+            </a:r>
+          </a:p>
+          <a:p>
+            <a:br>
+              <a:rPr lang="en-US" dirty="0"/>
+            </a:br>
+            <a:r>
+              <a:rPr lang="en-US" dirty="0"/>
+              <a:t>(c) High charges during daytime usage.</a:t>
             </a:r>
           </a:p>
         </p:txBody>
@@ -7041,7 +6983,7 @@
         <p:spPr>
           <a:xfrm>
             <a:off x="1823357" y="2041472"/>
-            <a:ext cx="8545286" cy="2775055"/>
+            <a:ext cx="8545286" cy="3329053"/>
           </a:xfrm>
           <a:prstGeom prst="rect">
             <a:avLst/>
@@ -7094,7 +7036,25 @@
             </a:pPr>
             <a:r>
               <a:rPr lang="en-US" dirty="0"/>
-              <a:t>LinkedIn: www.linkedin.com/in/kelvin-shilisia-2b289b108</a:t>
+              <a:t>LinkedIn: </a:t>
+            </a:r>
+            <a:r>
+              <a:rPr lang="en-US" dirty="0">
+                <a:hlinkClick r:id="rId2"/>
+              </a:rPr>
+              <a:t>www.linkedin.com/in/kelvin-shilisia-2b289b108</a:t>
+            </a:r>
+            <a:endParaRPr lang="en-US" dirty="0"/>
+          </a:p>
+          <a:p>
+            <a:pPr>
+              <a:lnSpc>
+                <a:spcPct val="200000"/>
+              </a:lnSpc>
+            </a:pPr>
+            <a:r>
+              <a:rPr lang="en-US" dirty="0"/>
+              <a:t>      		    Email: kelvinshilisia@gmail.com</a:t>
             </a:r>
             <a:br>
               <a:rPr lang="en-US" dirty="0"/>

</xml_diff>

<commit_message>
2nd Model and tuning
</commit_message>
<xml_diff>
--- a/Churn Prediction in Telecom.pptx
+++ b/Churn Prediction in Telecom.pptx
@@ -6293,8 +6293,8 @@
         </p:nvSpPr>
         <p:spPr>
           <a:xfrm>
-            <a:off x="413657" y="368111"/>
-            <a:ext cx="11168743" cy="6832640"/>
+            <a:off x="413657" y="270139"/>
+            <a:ext cx="11168743" cy="7386638"/>
           </a:xfrm>
           <a:prstGeom prst="rect">
             <a:avLst/>
@@ -6437,12 +6437,14 @@
           <a:p>
             <a:r>
               <a:rPr lang="en-US" dirty="0"/>
-              <a:t>I Tried various algorithms; then chose one with highest accuracy and reliability Random Forest Classifier was likely chosen due to High ROC-AUC score (~0.917)</a:t>
-            </a:r>
-          </a:p>
-          <a:p>
-            <a:pPr lvl="1"/>
-            <a:endParaRPr lang="en-US" dirty="0"/>
+              <a:t>I Tried various algorithms; then chose one with highest accuracy and reliability Random Forest Classifier was likely chosen due to High ROC-AUC score (~0.917).</a:t>
+            </a:r>
+          </a:p>
+          <a:p>
+            <a:r>
+              <a:rPr lang="en-US" dirty="0"/>
+              <a:t>The Gradient Boosting Machine had a slightly lower accuracy compared to this. After the tuning of the model, there was just a slight improvement in terms of change.</a:t>
+            </a:r>
           </a:p>
           <a:p>
             <a:pPr>

</xml_diff>